<commit_message>
Immediately before sending draft 4 to PI
</commit_message>
<xml_diff>
--- a/figures_continuous.pptx
+++ b/figures_continuous.pptx
@@ -243,7 +243,7 @@
           <a:p>
             <a:fld id="{ECBB92FC-8F75-4486-B15F-E2DC7AE42A8B}" type="datetimeFigureOut">
               <a:rPr lang="en-US" smtClean="0"/>
-              <a:t>6/4/20</a:t>
+              <a:t>6/8/20</a:t>
             </a:fld>
             <a:endParaRPr lang="en-US"/>
           </a:p>
@@ -413,7 +413,7 @@
           <a:p>
             <a:fld id="{ECBB92FC-8F75-4486-B15F-E2DC7AE42A8B}" type="datetimeFigureOut">
               <a:rPr lang="en-US" smtClean="0"/>
-              <a:t>6/4/20</a:t>
+              <a:t>6/8/20</a:t>
             </a:fld>
             <a:endParaRPr lang="en-US"/>
           </a:p>
@@ -593,7 +593,7 @@
           <a:p>
             <a:fld id="{ECBB92FC-8F75-4486-B15F-E2DC7AE42A8B}" type="datetimeFigureOut">
               <a:rPr lang="en-US" smtClean="0"/>
-              <a:t>6/4/20</a:t>
+              <a:t>6/8/20</a:t>
             </a:fld>
             <a:endParaRPr lang="en-US"/>
           </a:p>
@@ -763,7 +763,7 @@
           <a:p>
             <a:fld id="{ECBB92FC-8F75-4486-B15F-E2DC7AE42A8B}" type="datetimeFigureOut">
               <a:rPr lang="en-US" smtClean="0"/>
-              <a:t>6/4/20</a:t>
+              <a:t>6/8/20</a:t>
             </a:fld>
             <a:endParaRPr lang="en-US"/>
           </a:p>
@@ -1007,7 +1007,7 @@
           <a:p>
             <a:fld id="{ECBB92FC-8F75-4486-B15F-E2DC7AE42A8B}" type="datetimeFigureOut">
               <a:rPr lang="en-US" smtClean="0"/>
-              <a:t>6/4/20</a:t>
+              <a:t>6/8/20</a:t>
             </a:fld>
             <a:endParaRPr lang="en-US"/>
           </a:p>
@@ -1239,7 +1239,7 @@
           <a:p>
             <a:fld id="{ECBB92FC-8F75-4486-B15F-E2DC7AE42A8B}" type="datetimeFigureOut">
               <a:rPr lang="en-US" smtClean="0"/>
-              <a:t>6/4/20</a:t>
+              <a:t>6/8/20</a:t>
             </a:fld>
             <a:endParaRPr lang="en-US"/>
           </a:p>
@@ -1606,7 +1606,7 @@
           <a:p>
             <a:fld id="{ECBB92FC-8F75-4486-B15F-E2DC7AE42A8B}" type="datetimeFigureOut">
               <a:rPr lang="en-US" smtClean="0"/>
-              <a:t>6/4/20</a:t>
+              <a:t>6/8/20</a:t>
             </a:fld>
             <a:endParaRPr lang="en-US"/>
           </a:p>
@@ -1724,7 +1724,7 @@
           <a:p>
             <a:fld id="{ECBB92FC-8F75-4486-B15F-E2DC7AE42A8B}" type="datetimeFigureOut">
               <a:rPr lang="en-US" smtClean="0"/>
-              <a:t>6/4/20</a:t>
+              <a:t>6/8/20</a:t>
             </a:fld>
             <a:endParaRPr lang="en-US"/>
           </a:p>
@@ -1819,7 +1819,7 @@
           <a:p>
             <a:fld id="{ECBB92FC-8F75-4486-B15F-E2DC7AE42A8B}" type="datetimeFigureOut">
               <a:rPr lang="en-US" smtClean="0"/>
-              <a:t>6/4/20</a:t>
+              <a:t>6/8/20</a:t>
             </a:fld>
             <a:endParaRPr lang="en-US"/>
           </a:p>
@@ -2096,7 +2096,7 @@
           <a:p>
             <a:fld id="{ECBB92FC-8F75-4486-B15F-E2DC7AE42A8B}" type="datetimeFigureOut">
               <a:rPr lang="en-US" smtClean="0"/>
-              <a:t>6/4/20</a:t>
+              <a:t>6/8/20</a:t>
             </a:fld>
             <a:endParaRPr lang="en-US"/>
           </a:p>
@@ -2353,7 +2353,7 @@
           <a:p>
             <a:fld id="{ECBB92FC-8F75-4486-B15F-E2DC7AE42A8B}" type="datetimeFigureOut">
               <a:rPr lang="en-US" smtClean="0"/>
-              <a:t>6/4/20</a:t>
+              <a:t>6/8/20</a:t>
             </a:fld>
             <a:endParaRPr lang="en-US"/>
           </a:p>
@@ -2566,7 +2566,7 @@
           <a:p>
             <a:fld id="{ECBB92FC-8F75-4486-B15F-E2DC7AE42A8B}" type="datetimeFigureOut">
               <a:rPr lang="en-US" smtClean="0"/>
-              <a:t>6/4/20</a:t>
+              <a:t>6/8/20</a:t>
             </a:fld>
             <a:endParaRPr lang="en-US"/>
           </a:p>
@@ -2973,10 +2973,10 @@
       </p:grpSpPr>
       <p:pic>
         <p:nvPicPr>
-          <p:cNvPr id="79" name="Picture 78">
+          <p:cNvPr id="43" name="Picture 42" descr="A close up of a map&#10;&#10;Description automatically generated">
             <a:extLst>
               <a:ext uri="{FF2B5EF4-FFF2-40B4-BE49-F238E27FC236}">
-                <a16:creationId xmlns:a16="http://schemas.microsoft.com/office/drawing/2014/main" id="{EA9D9483-6D08-3A48-ABA3-E73F2F812D4A}"/>
+                <a16:creationId xmlns:a16="http://schemas.microsoft.com/office/drawing/2014/main" id="{86461FA1-9115-1844-B079-B36D1DD698F4}"/>
               </a:ext>
             </a:extLst>
           </p:cNvPr>
@@ -2987,19 +2987,56 @@
         </p:nvPicPr>
         <p:blipFill rotWithShape="1">
           <a:blip r:embed="rId2">
+            <a:alphaModFix/>
             <a:extLst>
               <a:ext uri="{28A0092B-C50C-407E-A947-70E740481C1C}">
                 <a14:useLocalDpi xmlns:a14="http://schemas.microsoft.com/office/drawing/2010/main" val="0"/>
               </a:ext>
             </a:extLst>
           </a:blip>
-          <a:srcRect t="3807" r="7496"/>
+          <a:srcRect t="15790" b="11943"/>
           <a:stretch/>
         </p:blipFill>
         <p:spPr>
           <a:xfrm>
-            <a:off x="1630477" y="0"/>
-            <a:ext cx="11218019" cy="6930804"/>
+            <a:off x="2965157" y="-1"/>
+            <a:ext cx="9875452" cy="7113683"/>
+          </a:xfrm>
+          <a:prstGeom prst="rect">
+            <a:avLst/>
+          </a:prstGeom>
+        </p:spPr>
+      </p:pic>
+      <p:pic>
+        <p:nvPicPr>
+          <p:cNvPr id="11" name="Picture 10" descr="A screenshot of a cell phone&#10;&#10;Description automatically generated">
+            <a:extLst>
+              <a:ext uri="{FF2B5EF4-FFF2-40B4-BE49-F238E27FC236}">
+                <a16:creationId xmlns:a16="http://schemas.microsoft.com/office/drawing/2014/main" id="{9AF3B75F-84F5-4342-91DA-A14E4FF21EA5}"/>
+              </a:ext>
+            </a:extLst>
+          </p:cNvPr>
+          <p:cNvPicPr>
+            <a:picLocks noChangeAspect="1"/>
+          </p:cNvPicPr>
+          <p:nvPr/>
+        </p:nvPicPr>
+        <p:blipFill>
+          <a:blip r:embed="rId3">
+            <a:extLst>
+              <a:ext uri="{28A0092B-C50C-407E-A947-70E740481C1C}">
+                <a14:useLocalDpi xmlns:a14="http://schemas.microsoft.com/office/drawing/2010/main" val="0"/>
+              </a:ext>
+            </a:extLst>
+          </a:blip>
+          <a:stretch>
+            <a:fillRect/>
+          </a:stretch>
+        </p:blipFill>
+        <p:spPr>
+          <a:xfrm>
+            <a:off x="25616" y="7231234"/>
+            <a:ext cx="13716000" cy="5600700"/>
           </a:xfrm>
           <a:prstGeom prst="rect">
             <a:avLst/>
@@ -3021,7 +3058,7 @@
         <p:spPr>
           <a:xfrm>
             <a:off x="1" y="-107052"/>
-            <a:ext cx="495649" cy="707886"/>
+            <a:ext cx="554960" cy="707886"/>
           </a:xfrm>
           <a:prstGeom prst="rect">
             <a:avLst/>
@@ -3035,7 +3072,10 @@
           <a:lstStyle/>
           <a:p>
             <a:r>
-              <a:rPr lang="en-US" sz="4000" b="1" dirty="0"/>
+              <a:rPr lang="en-US" sz="4000" b="1" dirty="0">
+                <a:latin typeface="Arial" panose="020B0604020202020204" pitchFamily="34" charset="0"/>
+                <a:cs typeface="Arial" panose="020B0604020202020204" pitchFamily="34" charset="0"/>
+              </a:rPr>
               <a:t>A</a:t>
             </a:r>
           </a:p>
@@ -3056,7 +3096,7 @@
         <p:spPr>
           <a:xfrm>
             <a:off x="873066" y="3974362"/>
-            <a:ext cx="1595309" cy="3139321"/>
+            <a:ext cx="1531188" cy="3139321"/>
           </a:xfrm>
           <a:prstGeom prst="rect">
             <a:avLst/>
@@ -3070,14 +3110,14 @@
           <a:lstStyle/>
           <a:p>
             <a:r>
-              <a:rPr lang="en-US" sz="1600" b="1" dirty="0">
+              <a:rPr lang="en-US" sz="1600" dirty="0">
                 <a:latin typeface="Arial" panose="020B0604020202020204" pitchFamily="34" charset="0"/>
                 <a:cs typeface="Arial" panose="020B0604020202020204" pitchFamily="34" charset="0"/>
               </a:rPr>
               <a:t>1</a:t>
             </a:r>
             <a:r>
-              <a:rPr lang="en-US" b="1" dirty="0">
+              <a:rPr lang="en-US" dirty="0">
                 <a:latin typeface="Arial" panose="020B0604020202020204" pitchFamily="34" charset="0"/>
                 <a:cs typeface="Arial" panose="020B0604020202020204" pitchFamily="34" charset="0"/>
               </a:rPr>
@@ -3086,7 +3126,7 @@
           </a:p>
           <a:p>
             <a:r>
-              <a:rPr lang="en-US" b="1" dirty="0">
+              <a:rPr lang="en-US" dirty="0">
                 <a:latin typeface="Arial" panose="020B0604020202020204" pitchFamily="34" charset="0"/>
                 <a:cs typeface="Arial" panose="020B0604020202020204" pitchFamily="34" charset="0"/>
               </a:rPr>
@@ -3095,7 +3135,7 @@
           </a:p>
           <a:p>
             <a:r>
-              <a:rPr lang="en-US" b="1" dirty="0">
+              <a:rPr lang="en-US" dirty="0">
                 <a:latin typeface="Arial" panose="020B0604020202020204" pitchFamily="34" charset="0"/>
                 <a:cs typeface="Arial" panose="020B0604020202020204" pitchFamily="34" charset="0"/>
               </a:rPr>
@@ -3104,7 +3144,7 @@
           </a:p>
           <a:p>
             <a:r>
-              <a:rPr lang="en-US" b="1" dirty="0">
+              <a:rPr lang="en-US" dirty="0">
                 <a:latin typeface="Arial" panose="020B0604020202020204" pitchFamily="34" charset="0"/>
                 <a:cs typeface="Arial" panose="020B0604020202020204" pitchFamily="34" charset="0"/>
               </a:rPr>
@@ -3113,7 +3153,7 @@
           </a:p>
           <a:p>
             <a:r>
-              <a:rPr lang="en-US" b="1" dirty="0">
+              <a:rPr lang="en-US" dirty="0">
                 <a:latin typeface="Arial" panose="020B0604020202020204" pitchFamily="34" charset="0"/>
                 <a:cs typeface="Arial" panose="020B0604020202020204" pitchFamily="34" charset="0"/>
               </a:rPr>
@@ -3122,7 +3162,7 @@
           </a:p>
           <a:p>
             <a:r>
-              <a:rPr lang="en-US" b="1" dirty="0">
+              <a:rPr lang="en-US" dirty="0">
                 <a:latin typeface="Arial" panose="020B0604020202020204" pitchFamily="34" charset="0"/>
                 <a:cs typeface="Arial" panose="020B0604020202020204" pitchFamily="34" charset="0"/>
               </a:rPr>
@@ -3131,7 +3171,7 @@
           </a:p>
           <a:p>
             <a:r>
-              <a:rPr lang="en-US" b="1" dirty="0">
+              <a:rPr lang="en-US" dirty="0">
                 <a:latin typeface="Arial" panose="020B0604020202020204" pitchFamily="34" charset="0"/>
                 <a:cs typeface="Arial" panose="020B0604020202020204" pitchFamily="34" charset="0"/>
               </a:rPr>
@@ -3140,7 +3180,7 @@
           </a:p>
           <a:p>
             <a:r>
-              <a:rPr lang="en-US" b="1" dirty="0">
+              <a:rPr lang="en-US" dirty="0">
                 <a:latin typeface="Arial" panose="020B0604020202020204" pitchFamily="34" charset="0"/>
                 <a:cs typeface="Arial" panose="020B0604020202020204" pitchFamily="34" charset="0"/>
               </a:rPr>
@@ -3149,7 +3189,7 @@
           </a:p>
           <a:p>
             <a:r>
-              <a:rPr lang="en-US" b="1" dirty="0">
+              <a:rPr lang="en-US" dirty="0">
                 <a:latin typeface="Arial" panose="020B0604020202020204" pitchFamily="34" charset="0"/>
                 <a:cs typeface="Arial" panose="020B0604020202020204" pitchFamily="34" charset="0"/>
               </a:rPr>
@@ -3158,7 +3198,7 @@
           </a:p>
           <a:p>
             <a:r>
-              <a:rPr lang="en-US" b="1" dirty="0">
+              <a:rPr lang="en-US" dirty="0">
                 <a:latin typeface="Arial" panose="020B0604020202020204" pitchFamily="34" charset="0"/>
                 <a:cs typeface="Arial" panose="020B0604020202020204" pitchFamily="34" charset="0"/>
               </a:rPr>
@@ -3166,7 +3206,7 @@
             </a:r>
           </a:p>
           <a:p>
-            <a:endParaRPr lang="en-US" b="1" dirty="0">
+            <a:endParaRPr lang="en-US" dirty="0">
               <a:latin typeface="Arial" panose="020B0604020202020204" pitchFamily="34" charset="0"/>
               <a:cs typeface="Arial" panose="020B0604020202020204" pitchFamily="34" charset="0"/>
             </a:endParaRPr>
@@ -3226,7 +3266,7 @@
         <p:spPr>
           <a:xfrm>
             <a:off x="2485902" y="3974365"/>
-            <a:ext cx="1941557" cy="2862322"/>
+            <a:ext cx="1851789" cy="2862322"/>
           </a:xfrm>
           <a:prstGeom prst="rect">
             <a:avLst/>
@@ -3240,7 +3280,7 @@
           <a:lstStyle/>
           <a:p>
             <a:r>
-              <a:rPr lang="en-US" b="1" dirty="0">
+              <a:rPr lang="en-US" dirty="0">
                 <a:latin typeface="Arial" panose="020B0604020202020204" pitchFamily="34" charset="0"/>
                 <a:cs typeface="Arial" panose="020B0604020202020204" pitchFamily="34" charset="0"/>
               </a:rPr>
@@ -3249,7 +3289,7 @@
           </a:p>
           <a:p>
             <a:r>
-              <a:rPr lang="en-US" b="1" dirty="0">
+              <a:rPr lang="en-US" dirty="0">
                 <a:latin typeface="Arial" panose="020B0604020202020204" pitchFamily="34" charset="0"/>
                 <a:cs typeface="Arial" panose="020B0604020202020204" pitchFamily="34" charset="0"/>
               </a:rPr>
@@ -3258,7 +3298,7 @@
           </a:p>
           <a:p>
             <a:r>
-              <a:rPr lang="en-US" b="1" dirty="0">
+              <a:rPr lang="en-US" dirty="0">
                 <a:latin typeface="Arial" panose="020B0604020202020204" pitchFamily="34" charset="0"/>
                 <a:cs typeface="Arial" panose="020B0604020202020204" pitchFamily="34" charset="0"/>
               </a:rPr>
@@ -3267,7 +3307,7 @@
           </a:p>
           <a:p>
             <a:r>
-              <a:rPr lang="en-US" b="1" dirty="0">
+              <a:rPr lang="en-US" dirty="0">
                 <a:latin typeface="Arial" panose="020B0604020202020204" pitchFamily="34" charset="0"/>
                 <a:cs typeface="Arial" panose="020B0604020202020204" pitchFamily="34" charset="0"/>
               </a:rPr>
@@ -3276,7 +3316,7 @@
           </a:p>
           <a:p>
             <a:r>
-              <a:rPr lang="en-US" b="1" dirty="0">
+              <a:rPr lang="en-US" dirty="0">
                 <a:latin typeface="Arial" panose="020B0604020202020204" pitchFamily="34" charset="0"/>
                 <a:cs typeface="Arial" panose="020B0604020202020204" pitchFamily="34" charset="0"/>
               </a:rPr>
@@ -3285,7 +3325,7 @@
           </a:p>
           <a:p>
             <a:r>
-              <a:rPr lang="en-US" b="1" dirty="0">
+              <a:rPr lang="en-US" dirty="0">
                 <a:latin typeface="Arial" panose="020B0604020202020204" pitchFamily="34" charset="0"/>
                 <a:cs typeface="Arial" panose="020B0604020202020204" pitchFamily="34" charset="0"/>
               </a:rPr>
@@ -3294,7 +3334,7 @@
           </a:p>
           <a:p>
             <a:r>
-              <a:rPr lang="en-US" b="1" dirty="0">
+              <a:rPr lang="en-US" dirty="0">
                 <a:latin typeface="Arial" panose="020B0604020202020204" pitchFamily="34" charset="0"/>
                 <a:cs typeface="Arial" panose="020B0604020202020204" pitchFamily="34" charset="0"/>
               </a:rPr>
@@ -3303,7 +3343,7 @@
           </a:p>
           <a:p>
             <a:r>
-              <a:rPr lang="en-US" b="1" dirty="0">
+              <a:rPr lang="en-US" dirty="0">
                 <a:latin typeface="Arial" panose="020B0604020202020204" pitchFamily="34" charset="0"/>
                 <a:cs typeface="Arial" panose="020B0604020202020204" pitchFamily="34" charset="0"/>
               </a:rPr>
@@ -3312,7 +3352,7 @@
           </a:p>
           <a:p>
             <a:r>
-              <a:rPr lang="en-US" b="1" dirty="0">
+              <a:rPr lang="en-US" dirty="0">
                 <a:latin typeface="Arial" panose="020B0604020202020204" pitchFamily="34" charset="0"/>
                 <a:cs typeface="Arial" panose="020B0604020202020204" pitchFamily="34" charset="0"/>
               </a:rPr>
@@ -3321,7 +3361,7 @@
           </a:p>
           <a:p>
             <a:r>
-              <a:rPr lang="en-US" b="1" dirty="0">
+              <a:rPr lang="en-US" dirty="0">
                 <a:latin typeface="Arial" panose="020B0604020202020204" pitchFamily="34" charset="0"/>
                 <a:cs typeface="Arial" panose="020B0604020202020204" pitchFamily="34" charset="0"/>
               </a:rPr>
@@ -4638,7 +4678,7 @@
         <p:spPr>
           <a:xfrm>
             <a:off x="0" y="6810208"/>
-            <a:ext cx="471604" cy="707886"/>
+            <a:ext cx="554960" cy="707886"/>
           </a:xfrm>
           <a:prstGeom prst="rect">
             <a:avLst/>
@@ -4652,7 +4692,10 @@
           <a:lstStyle/>
           <a:p>
             <a:r>
-              <a:rPr lang="en-US" sz="4000" b="1" dirty="0"/>
+              <a:rPr lang="en-US" sz="4000" b="1" dirty="0">
+                <a:latin typeface="Arial" panose="020B0604020202020204" pitchFamily="34" charset="0"/>
+                <a:cs typeface="Arial" panose="020B0604020202020204" pitchFamily="34" charset="0"/>
+              </a:rPr>
               <a:t>B</a:t>
             </a:r>
           </a:p>
@@ -4660,116 +4703,177 @@
       </p:sp>
       <p:sp>
         <p:nvSpPr>
-          <p:cNvPr id="69" name="TextBox 68">
+          <p:cNvPr id="2" name="Rectangle 1">
             <a:extLst>
               <a:ext uri="{FF2B5EF4-FFF2-40B4-BE49-F238E27FC236}">
-                <a16:creationId xmlns:a16="http://schemas.microsoft.com/office/drawing/2014/main" id="{D2EE9F0F-CAB8-BF44-894A-26E7DA98E62C}"/>
+                <a16:creationId xmlns:a16="http://schemas.microsoft.com/office/drawing/2014/main" id="{C2DFE852-1DFC-1443-A0D0-1746CF8288C2}"/>
               </a:ext>
             </a:extLst>
           </p:cNvPr>
-          <p:cNvSpPr txBox="1"/>
+          <p:cNvSpPr/>
           <p:nvPr/>
         </p:nvSpPr>
         <p:spPr>
           <a:xfrm>
-            <a:off x="10212370" y="12594542"/>
-            <a:ext cx="1756596" cy="1015663"/>
+            <a:off x="10496215" y="12455138"/>
+            <a:ext cx="2847253" cy="738664"/>
           </a:xfrm>
           <a:prstGeom prst="rect">
             <a:avLst/>
           </a:prstGeom>
-          <a:noFill/>
-        </p:spPr>
-        <p:txBody>
-          <a:bodyPr wrap="square" rtlCol="0">
+        </p:spPr>
+        <p:txBody>
+          <a:bodyPr wrap="none">
             <a:spAutoFit/>
           </a:bodyPr>
           <a:lstStyle/>
           <a:p>
-            <a:r>
-              <a:rPr lang="en-US" sz="2000" b="1" dirty="0">
+            <a:pPr algn="ctr"/>
+            <a:r>
+              <a:rPr lang="en-US" dirty="0">
                 <a:latin typeface="Arial" panose="020B0604020202020204" pitchFamily="34" charset="0"/>
                 <a:cs typeface="Arial" panose="020B0604020202020204" pitchFamily="34" charset="0"/>
               </a:rPr>
-              <a:t>Not wearing face covering</a:t>
-            </a:r>
-          </a:p>
-        </p:txBody>
-      </p:sp>
-      <p:sp>
-        <p:nvSpPr>
-          <p:cNvPr id="70" name="TextBox 69">
+              <a:t>Favors Face Covering</a:t>
+            </a:r>
+            <a:r>
+              <a:rPr lang="en-US" sz="2400" dirty="0">
+                <a:latin typeface="Arial" panose="020B0604020202020204" pitchFamily="34" charset="0"/>
+                <a:cs typeface="Arial" panose="020B0604020202020204" pitchFamily="34" charset="0"/>
+              </a:rPr>
+              <a:t> →</a:t>
+            </a:r>
+          </a:p>
+          <a:p>
+            <a:pPr algn="ctr"/>
+            <a:r>
+              <a:rPr lang="en-US" dirty="0">
+                <a:latin typeface="Arial" panose="020B0604020202020204" pitchFamily="34" charset="0"/>
+                <a:cs typeface="Arial" panose="020B0604020202020204" pitchFamily="34" charset="0"/>
+              </a:rPr>
+              <a:t>aOR (95% CI)</a:t>
+            </a:r>
+          </a:p>
+        </p:txBody>
+      </p:sp>
+      <p:cxnSp>
+        <p:nvCxnSpPr>
+          <p:cNvPr id="4" name="Straight Connector 3">
             <a:extLst>
               <a:ext uri="{FF2B5EF4-FFF2-40B4-BE49-F238E27FC236}">
-                <a16:creationId xmlns:a16="http://schemas.microsoft.com/office/drawing/2014/main" id="{1EDE3491-E36A-2045-8749-F4C41B8FAF83}"/>
+                <a16:creationId xmlns:a16="http://schemas.microsoft.com/office/drawing/2014/main" id="{D84C6580-2362-C34F-8703-BF7E9C5BE14D}"/>
               </a:ext>
             </a:extLst>
           </p:cNvPr>
-          <p:cNvSpPr txBox="1"/>
+          <p:cNvCxnSpPr/>
           <p:nvPr/>
-        </p:nvSpPr>
-        <p:spPr>
-          <a:xfrm>
-            <a:off x="11836710" y="12594541"/>
-            <a:ext cx="1624575" cy="1015663"/>
+        </p:nvCxnSpPr>
+        <p:spPr>
+          <a:xfrm>
+            <a:off x="10494451" y="7931426"/>
+            <a:ext cx="0" cy="4015409"/>
+          </a:xfrm>
+          <a:prstGeom prst="line">
+            <a:avLst/>
+          </a:prstGeom>
+          <a:ln>
+            <a:solidFill>
+              <a:schemeClr val="tx1"/>
+            </a:solidFill>
+            <a:prstDash val="dash"/>
+          </a:ln>
+        </p:spPr>
+        <p:style>
+          <a:lnRef idx="1">
+            <a:schemeClr val="accent1"/>
+          </a:lnRef>
+          <a:fillRef idx="0">
+            <a:schemeClr val="accent1"/>
+          </a:fillRef>
+          <a:effectRef idx="0">
+            <a:schemeClr val="accent1"/>
+          </a:effectRef>
+          <a:fontRef idx="minor">
+            <a:schemeClr val="tx1"/>
+          </a:fontRef>
+        </p:style>
+      </p:cxnSp>
+      <p:sp>
+        <p:nvSpPr>
+          <p:cNvPr id="53" name="Rectangle 52">
+            <a:extLst>
+              <a:ext uri="{FF2B5EF4-FFF2-40B4-BE49-F238E27FC236}">
+                <a16:creationId xmlns:a16="http://schemas.microsoft.com/office/drawing/2014/main" id="{3D1D5825-802B-0B42-9B90-9FB0328E2AB2}"/>
+              </a:ext>
+            </a:extLst>
+          </p:cNvPr>
+          <p:cNvSpPr/>
+          <p:nvPr/>
+        </p:nvSpPr>
+        <p:spPr>
+          <a:xfrm>
+            <a:off x="9507584" y="4005137"/>
+            <a:ext cx="479618" cy="369332"/>
           </a:xfrm>
           <a:prstGeom prst="rect">
             <a:avLst/>
           </a:prstGeom>
-          <a:noFill/>
-        </p:spPr>
-        <p:txBody>
-          <a:bodyPr wrap="square" rtlCol="0">
+        </p:spPr>
+        <p:txBody>
+          <a:bodyPr wrap="none">
             <a:spAutoFit/>
           </a:bodyPr>
           <a:lstStyle/>
           <a:p>
-            <a:pPr algn="r"/>
-            <a:r>
-              <a:rPr lang="en-US" sz="2000" b="1" dirty="0">
+            <a:pPr algn="ctr"/>
+            <a:r>
+              <a:rPr lang="en-US" dirty="0">
                 <a:latin typeface="Arial" panose="020B0604020202020204" pitchFamily="34" charset="0"/>
                 <a:cs typeface="Arial" panose="020B0604020202020204" pitchFamily="34" charset="0"/>
               </a:rPr>
-              <a:t>Wearing face covering</a:t>
-            </a:r>
-          </a:p>
-        </p:txBody>
-      </p:sp>
-      <p:pic>
-        <p:nvPicPr>
-          <p:cNvPr id="77" name="Picture 76">
+              <a:t>Fill</a:t>
+            </a:r>
+          </a:p>
+        </p:txBody>
+      </p:sp>
+      <p:sp>
+        <p:nvSpPr>
+          <p:cNvPr id="54" name="Rectangle 53">
             <a:extLst>
               <a:ext uri="{FF2B5EF4-FFF2-40B4-BE49-F238E27FC236}">
-                <a16:creationId xmlns:a16="http://schemas.microsoft.com/office/drawing/2014/main" id="{8AF2C918-6253-9C41-B305-982180B4AFE6}"/>
+                <a16:creationId xmlns:a16="http://schemas.microsoft.com/office/drawing/2014/main" id="{CF4DFECD-2670-964A-8DF6-29ED572E6189}"/>
               </a:ext>
             </a:extLst>
           </p:cNvPr>
-          <p:cNvPicPr>
-            <a:picLocks noChangeAspect="1"/>
-          </p:cNvPicPr>
+          <p:cNvSpPr/>
           <p:nvPr/>
-        </p:nvPicPr>
-        <p:blipFill rotWithShape="1">
-          <a:blip r:embed="rId3">
-            <a:extLst>
-              <a:ext uri="{28A0092B-C50C-407E-A947-70E740481C1C}">
-                <a14:useLocalDpi xmlns:a14="http://schemas.microsoft.com/office/drawing/2010/main" val="0"/>
-              </a:ext>
-            </a:extLst>
-          </a:blip>
-          <a:srcRect t="3729" b="4793"/>
-          <a:stretch/>
-        </p:blipFill>
-        <p:spPr>
-          <a:xfrm>
-            <a:off x="52364" y="7453865"/>
-            <a:ext cx="13663636" cy="5103817"/>
+        </p:nvSpPr>
+        <p:spPr>
+          <a:xfrm>
+            <a:off x="9060228" y="1507655"/>
+            <a:ext cx="915635" cy="369332"/>
           </a:xfrm>
           <a:prstGeom prst="rect">
             <a:avLst/>
           </a:prstGeom>
         </p:spPr>
-      </p:pic>
+        <p:txBody>
+          <a:bodyPr wrap="none">
+            <a:spAutoFit/>
+          </a:bodyPr>
+          <a:lstStyle/>
+          <a:p>
+            <a:pPr algn="ctr"/>
+            <a:r>
+              <a:rPr lang="en-US" dirty="0">
+                <a:latin typeface="Arial" panose="020B0604020202020204" pitchFamily="34" charset="0"/>
+                <a:cs typeface="Arial" panose="020B0604020202020204" pitchFamily="34" charset="0"/>
+              </a:rPr>
+              <a:t>Outline</a:t>
+            </a:r>
+          </a:p>
+        </p:txBody>
+      </p:sp>
     </p:spTree>
     <p:extLst>
       <p:ext uri="{BB962C8B-B14F-4D97-AF65-F5344CB8AC3E}">

</xml_diff>

<commit_message>
update on june 21st - correlation between case prevalence and mask usage
</commit_message>
<xml_diff>
--- a/figures_continuous.pptx
+++ b/figures_continuous.pptx
@@ -2,12 +2,12 @@
 <file path=ppt/presentation.xml><?xml version="1.0" encoding="utf-8"?>
 <p:presentation xmlns:a="http://schemas.openxmlformats.org/drawingml/2006/main" xmlns:r="http://schemas.openxmlformats.org/officeDocument/2006/relationships" xmlns:p="http://schemas.openxmlformats.org/presentationml/2006/main" saveSubsetFonts="1">
   <p:sldMasterIdLst>
-    <p:sldMasterId id="2147483816" r:id="rId1"/>
+    <p:sldMasterId id="2147483828" r:id="rId1"/>
   </p:sldMasterIdLst>
   <p:sldIdLst>
     <p:sldId id="257" r:id="rId2"/>
   </p:sldIdLst>
-  <p:sldSz cx="13716000" cy="13716000"/>
+  <p:sldSz cx="13716000" cy="13258800"/>
   <p:notesSz cx="6858000" cy="9144000"/>
   <p:defaultTextStyle>
     <a:defPPr>
@@ -141,8 +141,8 @@
         </p:nvSpPr>
         <p:spPr>
           <a:xfrm>
-            <a:off x="1028700" y="2244726"/>
-            <a:ext cx="11658600" cy="4775200"/>
+            <a:off x="1028700" y="2169902"/>
+            <a:ext cx="11658600" cy="4616027"/>
           </a:xfrm>
         </p:spPr>
         <p:txBody>
@@ -173,8 +173,8 @@
         </p:nvSpPr>
         <p:spPr>
           <a:xfrm>
-            <a:off x="1714500" y="7204076"/>
-            <a:ext cx="10287000" cy="3311524"/>
+            <a:off x="1714500" y="6963940"/>
+            <a:ext cx="10287000" cy="3201140"/>
           </a:xfrm>
         </p:spPr>
         <p:txBody>
@@ -243,7 +243,7 @@
           <a:p>
             <a:fld id="{ECBB92FC-8F75-4486-B15F-E2DC7AE42A8B}" type="datetimeFigureOut">
               <a:rPr lang="en-US" smtClean="0"/>
-              <a:t>6/8/20</a:t>
+              <a:t>6/21/20</a:t>
             </a:fld>
             <a:endParaRPr lang="en-US"/>
           </a:p>
@@ -294,7 +294,7 @@
     </p:spTree>
     <p:extLst>
       <p:ext uri="{BB962C8B-B14F-4D97-AF65-F5344CB8AC3E}">
-        <p14:creationId xmlns:p14="http://schemas.microsoft.com/office/powerpoint/2010/main" val="1186338138"/>
+        <p14:creationId xmlns:p14="http://schemas.microsoft.com/office/powerpoint/2010/main" val="2003249947"/>
       </p:ext>
     </p:extLst>
   </p:cSld>
@@ -413,7 +413,7 @@
           <a:p>
             <a:fld id="{ECBB92FC-8F75-4486-B15F-E2DC7AE42A8B}" type="datetimeFigureOut">
               <a:rPr lang="en-US" smtClean="0"/>
-              <a:t>6/8/20</a:t>
+              <a:t>6/21/20</a:t>
             </a:fld>
             <a:endParaRPr lang="en-US"/>
           </a:p>
@@ -464,7 +464,7 @@
     </p:spTree>
     <p:extLst>
       <p:ext uri="{BB962C8B-B14F-4D97-AF65-F5344CB8AC3E}">
-        <p14:creationId xmlns:p14="http://schemas.microsoft.com/office/powerpoint/2010/main" val="356036767"/>
+        <p14:creationId xmlns:p14="http://schemas.microsoft.com/office/powerpoint/2010/main" val="566945703"/>
       </p:ext>
     </p:extLst>
   </p:cSld>
@@ -503,8 +503,8 @@
         </p:nvSpPr>
         <p:spPr>
           <a:xfrm>
-            <a:off x="9815513" y="730250"/>
-            <a:ext cx="2957513" cy="11623676"/>
+            <a:off x="9815513" y="705908"/>
+            <a:ext cx="2957513" cy="11236220"/>
           </a:xfrm>
         </p:spPr>
         <p:txBody>
@@ -531,8 +531,8 @@
         </p:nvSpPr>
         <p:spPr>
           <a:xfrm>
-            <a:off x="942976" y="730250"/>
-            <a:ext cx="8701088" cy="11623676"/>
+            <a:off x="942976" y="705908"/>
+            <a:ext cx="8701088" cy="11236220"/>
           </a:xfrm>
         </p:spPr>
         <p:txBody>
@@ -593,7 +593,7 @@
           <a:p>
             <a:fld id="{ECBB92FC-8F75-4486-B15F-E2DC7AE42A8B}" type="datetimeFigureOut">
               <a:rPr lang="en-US" smtClean="0"/>
-              <a:t>6/8/20</a:t>
+              <a:t>6/21/20</a:t>
             </a:fld>
             <a:endParaRPr lang="en-US"/>
           </a:p>
@@ -644,7 +644,7 @@
     </p:spTree>
     <p:extLst>
       <p:ext uri="{BB962C8B-B14F-4D97-AF65-F5344CB8AC3E}">
-        <p14:creationId xmlns:p14="http://schemas.microsoft.com/office/powerpoint/2010/main" val="1524277505"/>
+        <p14:creationId xmlns:p14="http://schemas.microsoft.com/office/powerpoint/2010/main" val="2077903208"/>
       </p:ext>
     </p:extLst>
   </p:cSld>
@@ -763,7 +763,7 @@
           <a:p>
             <a:fld id="{ECBB92FC-8F75-4486-B15F-E2DC7AE42A8B}" type="datetimeFigureOut">
               <a:rPr lang="en-US" smtClean="0"/>
-              <a:t>6/8/20</a:t>
+              <a:t>6/21/20</a:t>
             </a:fld>
             <a:endParaRPr lang="en-US"/>
           </a:p>
@@ -814,7 +814,7 @@
     </p:spTree>
     <p:extLst>
       <p:ext uri="{BB962C8B-B14F-4D97-AF65-F5344CB8AC3E}">
-        <p14:creationId xmlns:p14="http://schemas.microsoft.com/office/powerpoint/2010/main" val="2245163291"/>
+        <p14:creationId xmlns:p14="http://schemas.microsoft.com/office/powerpoint/2010/main" val="4157038119"/>
       </p:ext>
     </p:extLst>
   </p:cSld>
@@ -853,8 +853,8 @@
         </p:nvSpPr>
         <p:spPr>
           <a:xfrm>
-            <a:off x="935832" y="3419479"/>
-            <a:ext cx="11830050" cy="5705474"/>
+            <a:off x="935832" y="3305496"/>
+            <a:ext cx="11830050" cy="5515292"/>
           </a:xfrm>
         </p:spPr>
         <p:txBody>
@@ -885,8 +885,8 @@
         </p:nvSpPr>
         <p:spPr>
           <a:xfrm>
-            <a:off x="935832" y="9178929"/>
-            <a:ext cx="11830050" cy="3000374"/>
+            <a:off x="935832" y="8872964"/>
+            <a:ext cx="11830050" cy="2900362"/>
           </a:xfrm>
         </p:spPr>
         <p:txBody>
@@ -1007,7 +1007,7 @@
           <a:p>
             <a:fld id="{ECBB92FC-8F75-4486-B15F-E2DC7AE42A8B}" type="datetimeFigureOut">
               <a:rPr lang="en-US" smtClean="0"/>
-              <a:t>6/8/20</a:t>
+              <a:t>6/21/20</a:t>
             </a:fld>
             <a:endParaRPr lang="en-US"/>
           </a:p>
@@ -1058,7 +1058,7 @@
     </p:spTree>
     <p:extLst>
       <p:ext uri="{BB962C8B-B14F-4D97-AF65-F5344CB8AC3E}">
-        <p14:creationId xmlns:p14="http://schemas.microsoft.com/office/powerpoint/2010/main" val="4285396664"/>
+        <p14:creationId xmlns:p14="http://schemas.microsoft.com/office/powerpoint/2010/main" val="1091095199"/>
       </p:ext>
     </p:extLst>
   </p:cSld>
@@ -1120,8 +1120,8 @@
         </p:nvSpPr>
         <p:spPr>
           <a:xfrm>
-            <a:off x="942975" y="3651250"/>
-            <a:ext cx="5829300" cy="8702676"/>
+            <a:off x="942975" y="3529542"/>
+            <a:ext cx="5829300" cy="8412587"/>
           </a:xfrm>
         </p:spPr>
         <p:txBody>
@@ -1177,8 +1177,8 @@
         </p:nvSpPr>
         <p:spPr>
           <a:xfrm>
-            <a:off x="6943725" y="3651250"/>
-            <a:ext cx="5829300" cy="8702676"/>
+            <a:off x="6943725" y="3529542"/>
+            <a:ext cx="5829300" cy="8412587"/>
           </a:xfrm>
         </p:spPr>
         <p:txBody>
@@ -1239,7 +1239,7 @@
           <a:p>
             <a:fld id="{ECBB92FC-8F75-4486-B15F-E2DC7AE42A8B}" type="datetimeFigureOut">
               <a:rPr lang="en-US" smtClean="0"/>
-              <a:t>6/8/20</a:t>
+              <a:t>6/21/20</a:t>
             </a:fld>
             <a:endParaRPr lang="en-US"/>
           </a:p>
@@ -1290,7 +1290,7 @@
     </p:spTree>
     <p:extLst>
       <p:ext uri="{BB962C8B-B14F-4D97-AF65-F5344CB8AC3E}">
-        <p14:creationId xmlns:p14="http://schemas.microsoft.com/office/powerpoint/2010/main" val="191656768"/>
+        <p14:creationId xmlns:p14="http://schemas.microsoft.com/office/powerpoint/2010/main" val="2880591970"/>
       </p:ext>
     </p:extLst>
   </p:cSld>
@@ -1329,8 +1329,8 @@
         </p:nvSpPr>
         <p:spPr>
           <a:xfrm>
-            <a:off x="944762" y="730253"/>
-            <a:ext cx="11830050" cy="2651126"/>
+            <a:off x="944762" y="705911"/>
+            <a:ext cx="11830050" cy="2562755"/>
           </a:xfrm>
         </p:spPr>
         <p:txBody>
@@ -1357,8 +1357,8 @@
         </p:nvSpPr>
         <p:spPr>
           <a:xfrm>
-            <a:off x="944763" y="3362326"/>
-            <a:ext cx="5802510" cy="1647824"/>
+            <a:off x="944763" y="3250248"/>
+            <a:ext cx="5802510" cy="1592897"/>
           </a:xfrm>
         </p:spPr>
         <p:txBody>
@@ -1422,8 +1422,8 @@
         </p:nvSpPr>
         <p:spPr>
           <a:xfrm>
-            <a:off x="944763" y="5010150"/>
-            <a:ext cx="5802510" cy="7369176"/>
+            <a:off x="944763" y="4843145"/>
+            <a:ext cx="5802510" cy="7123537"/>
           </a:xfrm>
         </p:spPr>
         <p:txBody>
@@ -1479,8 +1479,8 @@
         </p:nvSpPr>
         <p:spPr>
           <a:xfrm>
-            <a:off x="6943726" y="3362326"/>
-            <a:ext cx="5831087" cy="1647824"/>
+            <a:off x="6943726" y="3250248"/>
+            <a:ext cx="5831087" cy="1592897"/>
           </a:xfrm>
         </p:spPr>
         <p:txBody>
@@ -1544,8 +1544,8 @@
         </p:nvSpPr>
         <p:spPr>
           <a:xfrm>
-            <a:off x="6943726" y="5010150"/>
-            <a:ext cx="5831087" cy="7369176"/>
+            <a:off x="6943726" y="4843145"/>
+            <a:ext cx="5831087" cy="7123537"/>
           </a:xfrm>
         </p:spPr>
         <p:txBody>
@@ -1606,7 +1606,7 @@
           <a:p>
             <a:fld id="{ECBB92FC-8F75-4486-B15F-E2DC7AE42A8B}" type="datetimeFigureOut">
               <a:rPr lang="en-US" smtClean="0"/>
-              <a:t>6/8/20</a:t>
+              <a:t>6/21/20</a:t>
             </a:fld>
             <a:endParaRPr lang="en-US"/>
           </a:p>
@@ -1657,7 +1657,7 @@
     </p:spTree>
     <p:extLst>
       <p:ext uri="{BB962C8B-B14F-4D97-AF65-F5344CB8AC3E}">
-        <p14:creationId xmlns:p14="http://schemas.microsoft.com/office/powerpoint/2010/main" val="3400440516"/>
+        <p14:creationId xmlns:p14="http://schemas.microsoft.com/office/powerpoint/2010/main" val="2694314038"/>
       </p:ext>
     </p:extLst>
   </p:cSld>
@@ -1724,7 +1724,7 @@
           <a:p>
             <a:fld id="{ECBB92FC-8F75-4486-B15F-E2DC7AE42A8B}" type="datetimeFigureOut">
               <a:rPr lang="en-US" smtClean="0"/>
-              <a:t>6/8/20</a:t>
+              <a:t>6/21/20</a:t>
             </a:fld>
             <a:endParaRPr lang="en-US"/>
           </a:p>
@@ -1775,7 +1775,7 @@
     </p:spTree>
     <p:extLst>
       <p:ext uri="{BB962C8B-B14F-4D97-AF65-F5344CB8AC3E}">
-        <p14:creationId xmlns:p14="http://schemas.microsoft.com/office/powerpoint/2010/main" val="3591067340"/>
+        <p14:creationId xmlns:p14="http://schemas.microsoft.com/office/powerpoint/2010/main" val="2489579447"/>
       </p:ext>
     </p:extLst>
   </p:cSld>
@@ -1819,7 +1819,7 @@
           <a:p>
             <a:fld id="{ECBB92FC-8F75-4486-B15F-E2DC7AE42A8B}" type="datetimeFigureOut">
               <a:rPr lang="en-US" smtClean="0"/>
-              <a:t>6/8/20</a:t>
+              <a:t>6/21/20</a:t>
             </a:fld>
             <a:endParaRPr lang="en-US"/>
           </a:p>
@@ -1870,7 +1870,7 @@
     </p:spTree>
     <p:extLst>
       <p:ext uri="{BB962C8B-B14F-4D97-AF65-F5344CB8AC3E}">
-        <p14:creationId xmlns:p14="http://schemas.microsoft.com/office/powerpoint/2010/main" val="219882689"/>
+        <p14:creationId xmlns:p14="http://schemas.microsoft.com/office/powerpoint/2010/main" val="3627423334"/>
       </p:ext>
     </p:extLst>
   </p:cSld>
@@ -1909,8 +1909,8 @@
         </p:nvSpPr>
         <p:spPr>
           <a:xfrm>
-            <a:off x="944762" y="914400"/>
-            <a:ext cx="4423767" cy="3200400"/>
+            <a:off x="944762" y="883920"/>
+            <a:ext cx="4423767" cy="3093720"/>
           </a:xfrm>
         </p:spPr>
         <p:txBody>
@@ -1941,8 +1941,8 @@
         </p:nvSpPr>
         <p:spPr>
           <a:xfrm>
-            <a:off x="5831087" y="1974853"/>
-            <a:ext cx="6943725" cy="9747250"/>
+            <a:off x="5831087" y="1909024"/>
+            <a:ext cx="6943725" cy="9422342"/>
           </a:xfrm>
         </p:spPr>
         <p:txBody>
@@ -2026,8 +2026,8 @@
         </p:nvSpPr>
         <p:spPr>
           <a:xfrm>
-            <a:off x="944762" y="4114800"/>
-            <a:ext cx="4423767" cy="7623176"/>
+            <a:off x="944762" y="3977640"/>
+            <a:ext cx="4423767" cy="7369070"/>
           </a:xfrm>
         </p:spPr>
         <p:txBody>
@@ -2096,7 +2096,7 @@
           <a:p>
             <a:fld id="{ECBB92FC-8F75-4486-B15F-E2DC7AE42A8B}" type="datetimeFigureOut">
               <a:rPr lang="en-US" smtClean="0"/>
-              <a:t>6/8/20</a:t>
+              <a:t>6/21/20</a:t>
             </a:fld>
             <a:endParaRPr lang="en-US"/>
           </a:p>
@@ -2147,7 +2147,7 @@
     </p:spTree>
     <p:extLst>
       <p:ext uri="{BB962C8B-B14F-4D97-AF65-F5344CB8AC3E}">
-        <p14:creationId xmlns:p14="http://schemas.microsoft.com/office/powerpoint/2010/main" val="2498624819"/>
+        <p14:creationId xmlns:p14="http://schemas.microsoft.com/office/powerpoint/2010/main" val="4226730548"/>
       </p:ext>
     </p:extLst>
   </p:cSld>
@@ -2186,8 +2186,8 @@
         </p:nvSpPr>
         <p:spPr>
           <a:xfrm>
-            <a:off x="944762" y="914400"/>
-            <a:ext cx="4423767" cy="3200400"/>
+            <a:off x="944762" y="883920"/>
+            <a:ext cx="4423767" cy="3093720"/>
           </a:xfrm>
         </p:spPr>
         <p:txBody>
@@ -2218,8 +2218,8 @@
         </p:nvSpPr>
         <p:spPr>
           <a:xfrm>
-            <a:off x="5831087" y="1974853"/>
-            <a:ext cx="6943725" cy="9747250"/>
+            <a:off x="5831087" y="1909024"/>
+            <a:ext cx="6943725" cy="9422342"/>
           </a:xfrm>
         </p:spPr>
         <p:txBody>
@@ -2283,8 +2283,8 @@
         </p:nvSpPr>
         <p:spPr>
           <a:xfrm>
-            <a:off x="944762" y="4114800"/>
-            <a:ext cx="4423767" cy="7623176"/>
+            <a:off x="944762" y="3977640"/>
+            <a:ext cx="4423767" cy="7369070"/>
           </a:xfrm>
         </p:spPr>
         <p:txBody>
@@ -2353,7 +2353,7 @@
           <a:p>
             <a:fld id="{ECBB92FC-8F75-4486-B15F-E2DC7AE42A8B}" type="datetimeFigureOut">
               <a:rPr lang="en-US" smtClean="0"/>
-              <a:t>6/8/20</a:t>
+              <a:t>6/21/20</a:t>
             </a:fld>
             <a:endParaRPr lang="en-US"/>
           </a:p>
@@ -2404,7 +2404,7 @@
     </p:spTree>
     <p:extLst>
       <p:ext uri="{BB962C8B-B14F-4D97-AF65-F5344CB8AC3E}">
-        <p14:creationId xmlns:p14="http://schemas.microsoft.com/office/powerpoint/2010/main" val="193949809"/>
+        <p14:creationId xmlns:p14="http://schemas.microsoft.com/office/powerpoint/2010/main" val="1398734621"/>
       </p:ext>
     </p:extLst>
   </p:cSld>
@@ -2448,8 +2448,8 @@
         </p:nvSpPr>
         <p:spPr>
           <a:xfrm>
-            <a:off x="942975" y="730253"/>
-            <a:ext cx="11830050" cy="2651126"/>
+            <a:off x="942975" y="705911"/>
+            <a:ext cx="11830050" cy="2562755"/>
           </a:xfrm>
           <a:prstGeom prst="rect">
             <a:avLst/>
@@ -2481,8 +2481,8 @@
         </p:nvSpPr>
         <p:spPr>
           <a:xfrm>
-            <a:off x="942975" y="3651250"/>
-            <a:ext cx="11830050" cy="8702676"/>
+            <a:off x="942975" y="3529542"/>
+            <a:ext cx="11830050" cy="8412587"/>
           </a:xfrm>
           <a:prstGeom prst="rect">
             <a:avLst/>
@@ -2543,8 +2543,8 @@
         </p:nvSpPr>
         <p:spPr>
           <a:xfrm>
-            <a:off x="942975" y="12712703"/>
-            <a:ext cx="3086100" cy="730250"/>
+            <a:off x="942975" y="12288946"/>
+            <a:ext cx="3086100" cy="705908"/>
           </a:xfrm>
           <a:prstGeom prst="rect">
             <a:avLst/>
@@ -2566,7 +2566,7 @@
           <a:p>
             <a:fld id="{ECBB92FC-8F75-4486-B15F-E2DC7AE42A8B}" type="datetimeFigureOut">
               <a:rPr lang="en-US" smtClean="0"/>
-              <a:t>6/8/20</a:t>
+              <a:t>6/21/20</a:t>
             </a:fld>
             <a:endParaRPr lang="en-US"/>
           </a:p>
@@ -2584,8 +2584,8 @@
         </p:nvSpPr>
         <p:spPr>
           <a:xfrm>
-            <a:off x="4543425" y="12712703"/>
-            <a:ext cx="4629150" cy="730250"/>
+            <a:off x="4543425" y="12288946"/>
+            <a:ext cx="4629150" cy="705908"/>
           </a:xfrm>
           <a:prstGeom prst="rect">
             <a:avLst/>
@@ -2621,8 +2621,8 @@
         </p:nvSpPr>
         <p:spPr>
           <a:xfrm>
-            <a:off x="9686925" y="12712703"/>
-            <a:ext cx="3086100" cy="730250"/>
+            <a:off x="9686925" y="12288946"/>
+            <a:ext cx="3086100" cy="705908"/>
           </a:xfrm>
           <a:prstGeom prst="rect">
             <a:avLst/>
@@ -2653,23 +2653,23 @@
     </p:spTree>
     <p:extLst>
       <p:ext uri="{BB962C8B-B14F-4D97-AF65-F5344CB8AC3E}">
-        <p14:creationId xmlns:p14="http://schemas.microsoft.com/office/powerpoint/2010/main" val="3349369770"/>
+        <p14:creationId xmlns:p14="http://schemas.microsoft.com/office/powerpoint/2010/main" val="202544810"/>
       </p:ext>
     </p:extLst>
   </p:cSld>
   <p:clrMap bg1="lt1" tx1="dk1" bg2="lt2" tx2="dk2" accent1="accent1" accent2="accent2" accent3="accent3" accent4="accent4" accent5="accent5" accent6="accent6" hlink="hlink" folHlink="folHlink"/>
   <p:sldLayoutIdLst>
-    <p:sldLayoutId id="2147483817" r:id="rId1"/>
-    <p:sldLayoutId id="2147483818" r:id="rId2"/>
-    <p:sldLayoutId id="2147483819" r:id="rId3"/>
-    <p:sldLayoutId id="2147483820" r:id="rId4"/>
-    <p:sldLayoutId id="2147483821" r:id="rId5"/>
-    <p:sldLayoutId id="2147483822" r:id="rId6"/>
-    <p:sldLayoutId id="2147483823" r:id="rId7"/>
-    <p:sldLayoutId id="2147483824" r:id="rId8"/>
-    <p:sldLayoutId id="2147483825" r:id="rId9"/>
-    <p:sldLayoutId id="2147483826" r:id="rId10"/>
-    <p:sldLayoutId id="2147483827" r:id="rId11"/>
+    <p:sldLayoutId id="2147483829" r:id="rId1"/>
+    <p:sldLayoutId id="2147483830" r:id="rId2"/>
+    <p:sldLayoutId id="2147483831" r:id="rId3"/>
+    <p:sldLayoutId id="2147483832" r:id="rId4"/>
+    <p:sldLayoutId id="2147483833" r:id="rId5"/>
+    <p:sldLayoutId id="2147483834" r:id="rId6"/>
+    <p:sldLayoutId id="2147483835" r:id="rId7"/>
+    <p:sldLayoutId id="2147483836" r:id="rId8"/>
+    <p:sldLayoutId id="2147483837" r:id="rId9"/>
+    <p:sldLayoutId id="2147483838" r:id="rId10"/>
+    <p:sldLayoutId id="2147483839" r:id="rId11"/>
   </p:sldLayoutIdLst>
   <p:txStyles>
     <p:titleStyle>
@@ -2973,10 +2973,10 @@
       </p:grpSpPr>
       <p:pic>
         <p:nvPicPr>
-          <p:cNvPr id="43" name="Picture 42" descr="A close up of a map&#10;&#10;Description automatically generated">
+          <p:cNvPr id="22" name="Picture 21">
             <a:extLst>
               <a:ext uri="{FF2B5EF4-FFF2-40B4-BE49-F238E27FC236}">
-                <a16:creationId xmlns:a16="http://schemas.microsoft.com/office/drawing/2014/main" id="{86461FA1-9115-1844-B079-B36D1DD698F4}"/>
+                <a16:creationId xmlns:a16="http://schemas.microsoft.com/office/drawing/2014/main" id="{BDC5CA03-F37D-3843-9F18-D984A8A296A1}"/>
               </a:ext>
             </a:extLst>
           </p:cNvPr>
@@ -2987,20 +2987,19 @@
         </p:nvPicPr>
         <p:blipFill rotWithShape="1">
           <a:blip r:embed="rId2">
-            <a:alphaModFix/>
             <a:extLst>
               <a:ext uri="{28A0092B-C50C-407E-A947-70E740481C1C}">
                 <a14:useLocalDpi xmlns:a14="http://schemas.microsoft.com/office/drawing/2010/main" val="0"/>
               </a:ext>
             </a:extLst>
           </a:blip>
-          <a:srcRect t="15790" b="11943"/>
+          <a:srcRect t="3369" r="5600"/>
           <a:stretch/>
         </p:blipFill>
         <p:spPr>
           <a:xfrm>
-            <a:off x="2965157" y="-1"/>
-            <a:ext cx="9875452" cy="7113683"/>
+            <a:off x="2280268" y="170481"/>
+            <a:ext cx="11218756" cy="6822887"/>
           </a:xfrm>
           <a:prstGeom prst="rect">
             <a:avLst/>
@@ -3009,10 +3008,10 @@
       </p:pic>
       <p:pic>
         <p:nvPicPr>
-          <p:cNvPr id="11" name="Picture 10" descr="A screenshot of a cell phone&#10;&#10;Description automatically generated">
+          <p:cNvPr id="16" name="Picture 15">
             <a:extLst>
               <a:ext uri="{FF2B5EF4-FFF2-40B4-BE49-F238E27FC236}">
-                <a16:creationId xmlns:a16="http://schemas.microsoft.com/office/drawing/2014/main" id="{9AF3B75F-84F5-4342-91DA-A14E4FF21EA5}"/>
+                <a16:creationId xmlns:a16="http://schemas.microsoft.com/office/drawing/2014/main" id="{445E50F9-74E5-6444-A787-99C7BB08022D}"/>
               </a:ext>
             </a:extLst>
           </p:cNvPr>
@@ -3021,7 +3020,7 @@
           </p:cNvPicPr>
           <p:nvPr/>
         </p:nvPicPr>
-        <p:blipFill>
+        <p:blipFill rotWithShape="1">
           <a:blip r:embed="rId3">
             <a:extLst>
               <a:ext uri="{28A0092B-C50C-407E-A947-70E740481C1C}">
@@ -3029,14 +3028,13 @@
               </a:ext>
             </a:extLst>
           </a:blip>
-          <a:stretch>
-            <a:fillRect/>
-          </a:stretch>
+          <a:srcRect b="6497"/>
+          <a:stretch/>
         </p:blipFill>
         <p:spPr>
           <a:xfrm>
-            <a:off x="25616" y="7231234"/>
-            <a:ext cx="13716000" cy="5600700"/>
+            <a:off x="0" y="7413240"/>
+            <a:ext cx="13716000" cy="4834001"/>
           </a:xfrm>
           <a:prstGeom prst="rect">
             <a:avLst/>
@@ -3057,7 +3055,7 @@
         </p:nvSpPr>
         <p:spPr>
           <a:xfrm>
-            <a:off x="1" y="-107052"/>
+            <a:off x="1" y="0"/>
             <a:ext cx="554960" cy="707886"/>
           </a:xfrm>
           <a:prstGeom prst="rect">
@@ -3095,7 +3093,7 @@
         </p:nvSpPr>
         <p:spPr>
           <a:xfrm>
-            <a:off x="873066" y="3974362"/>
+            <a:off x="873066" y="4081415"/>
             <a:ext cx="1531188" cy="3139321"/>
           </a:xfrm>
           <a:prstGeom prst="rect">
@@ -3227,7 +3225,7 @@
         </p:nvSpPr>
         <p:spPr>
           <a:xfrm>
-            <a:off x="1803638" y="3635805"/>
+            <a:off x="1803638" y="3742857"/>
             <a:ext cx="1326004" cy="369332"/>
           </a:xfrm>
           <a:prstGeom prst="rect">
@@ -3265,7 +3263,7 @@
         </p:nvSpPr>
         <p:spPr>
           <a:xfrm>
-            <a:off x="2485902" y="3974365"/>
+            <a:off x="2485903" y="4081417"/>
             <a:ext cx="1851789" cy="2862322"/>
           </a:xfrm>
           <a:prstGeom prst="rect">
@@ -3384,7 +3382,7 @@
         </p:nvSpPr>
         <p:spPr>
           <a:xfrm>
-            <a:off x="6308425" y="4252636"/>
+            <a:off x="6308426" y="4359688"/>
             <a:ext cx="345753" cy="338554"/>
           </a:xfrm>
           <a:prstGeom prst="rect">
@@ -3443,7 +3441,7 @@
         </p:nvSpPr>
         <p:spPr>
           <a:xfrm>
-            <a:off x="8158605" y="3606494"/>
+            <a:off x="8158606" y="3713546"/>
             <a:ext cx="345753" cy="338554"/>
           </a:xfrm>
           <a:prstGeom prst="rect">
@@ -3502,7 +3500,7 @@
         </p:nvSpPr>
         <p:spPr>
           <a:xfrm>
-            <a:off x="6710740" y="5560736"/>
+            <a:off x="6710741" y="5667788"/>
             <a:ext cx="345753" cy="338554"/>
           </a:xfrm>
           <a:prstGeom prst="rect">
@@ -3561,7 +3559,7 @@
         </p:nvSpPr>
         <p:spPr>
           <a:xfrm>
-            <a:off x="5348570" y="5823090"/>
+            <a:off x="5348571" y="5930142"/>
             <a:ext cx="345753" cy="338554"/>
           </a:xfrm>
           <a:prstGeom prst="rect">
@@ -3620,7 +3618,7 @@
         </p:nvSpPr>
         <p:spPr>
           <a:xfrm>
-            <a:off x="5949526" y="5646209"/>
+            <a:off x="5949527" y="5753261"/>
             <a:ext cx="345753" cy="338554"/>
           </a:xfrm>
           <a:prstGeom prst="rect">
@@ -3679,7 +3677,7 @@
         </p:nvSpPr>
         <p:spPr>
           <a:xfrm>
-            <a:off x="5351071" y="3775771"/>
+            <a:off x="5351072" y="3882823"/>
             <a:ext cx="345753" cy="338554"/>
           </a:xfrm>
           <a:prstGeom prst="rect">
@@ -3738,7 +3736,7 @@
         </p:nvSpPr>
         <p:spPr>
           <a:xfrm>
-            <a:off x="8551451" y="5653813"/>
+            <a:off x="8551451" y="5760865"/>
             <a:ext cx="477988" cy="338554"/>
           </a:xfrm>
           <a:prstGeom prst="rect">
@@ -3797,7 +3795,7 @@
         </p:nvSpPr>
         <p:spPr>
           <a:xfrm>
-            <a:off x="5947511" y="6127890"/>
+            <a:off x="5947512" y="6234942"/>
             <a:ext cx="345753" cy="338554"/>
           </a:xfrm>
           <a:prstGeom prst="rect">
@@ -3856,7 +3854,7 @@
         </p:nvSpPr>
         <p:spPr>
           <a:xfrm>
-            <a:off x="5385216" y="4286302"/>
+            <a:off x="5385216" y="4393354"/>
             <a:ext cx="477988" cy="338554"/>
           </a:xfrm>
           <a:prstGeom prst="rect">
@@ -3915,7 +3913,7 @@
         </p:nvSpPr>
         <p:spPr>
           <a:xfrm>
-            <a:off x="7623592" y="3598038"/>
+            <a:off x="7623592" y="3705090"/>
             <a:ext cx="477988" cy="338554"/>
           </a:xfrm>
           <a:prstGeom prst="rect">
@@ -3974,7 +3972,7 @@
         </p:nvSpPr>
         <p:spPr>
           <a:xfrm>
-            <a:off x="3453842" y="3177821"/>
+            <a:off x="3453842" y="3284873"/>
             <a:ext cx="477988" cy="338554"/>
           </a:xfrm>
           <a:prstGeom prst="rect">
@@ -4033,7 +4031,7 @@
         </p:nvSpPr>
         <p:spPr>
           <a:xfrm>
-            <a:off x="3453840" y="2106929"/>
+            <a:off x="3453840" y="2213981"/>
             <a:ext cx="477988" cy="338554"/>
           </a:xfrm>
           <a:prstGeom prst="rect">
@@ -4092,7 +4090,7 @@
         </p:nvSpPr>
         <p:spPr>
           <a:xfrm>
-            <a:off x="3463267" y="2719831"/>
+            <a:off x="3463267" y="2826883"/>
             <a:ext cx="477988" cy="338554"/>
           </a:xfrm>
           <a:prstGeom prst="rect">
@@ -4151,7 +4149,7 @@
         </p:nvSpPr>
         <p:spPr>
           <a:xfrm>
-            <a:off x="8678451" y="5978544"/>
+            <a:off x="8678451" y="6085596"/>
             <a:ext cx="477988" cy="338554"/>
           </a:xfrm>
           <a:prstGeom prst="rect">
@@ -4210,7 +4208,7 @@
         </p:nvSpPr>
         <p:spPr>
           <a:xfrm>
-            <a:off x="6853281" y="4041455"/>
+            <a:off x="6853281" y="4148507"/>
             <a:ext cx="477988" cy="338554"/>
           </a:xfrm>
           <a:prstGeom prst="rect">
@@ -4269,7 +4267,7 @@
         </p:nvSpPr>
         <p:spPr>
           <a:xfrm>
-            <a:off x="7559910" y="6132067"/>
+            <a:off x="7559910" y="6239119"/>
             <a:ext cx="477988" cy="338554"/>
           </a:xfrm>
           <a:prstGeom prst="rect">
@@ -4328,7 +4326,7 @@
         </p:nvSpPr>
         <p:spPr>
           <a:xfrm>
-            <a:off x="5963054" y="3562994"/>
+            <a:off x="5963054" y="3670046"/>
             <a:ext cx="477988" cy="338554"/>
           </a:xfrm>
           <a:prstGeom prst="rect">
@@ -4387,7 +4385,7 @@
         </p:nvSpPr>
         <p:spPr>
           <a:xfrm>
-            <a:off x="8678451" y="6233667"/>
+            <a:off x="8678451" y="6340719"/>
             <a:ext cx="477988" cy="338554"/>
           </a:xfrm>
           <a:prstGeom prst="rect">
@@ -4446,7 +4444,7 @@
         </p:nvCxnSpPr>
         <p:spPr>
           <a:xfrm>
-            <a:off x="8315851" y="6185921"/>
+            <a:off x="8315851" y="6292973"/>
             <a:ext cx="474594" cy="0"/>
           </a:xfrm>
           <a:prstGeom prst="line">
@@ -4483,7 +4481,7 @@
         </p:nvCxnSpPr>
         <p:spPr>
           <a:xfrm>
-            <a:off x="8295840" y="6408883"/>
+            <a:off x="8295840" y="6515935"/>
             <a:ext cx="474594" cy="0"/>
           </a:xfrm>
           <a:prstGeom prst="line">
@@ -4522,7 +4520,7 @@
         </p:nvCxnSpPr>
         <p:spPr>
           <a:xfrm>
-            <a:off x="8351265" y="5845737"/>
+            <a:off x="8351266" y="5952789"/>
             <a:ext cx="327199" cy="0"/>
           </a:xfrm>
           <a:prstGeom prst="line">
@@ -4559,7 +4557,7 @@
         </p:nvSpPr>
         <p:spPr>
           <a:xfrm>
-            <a:off x="7426675" y="4081855"/>
+            <a:off x="7426675" y="4188907"/>
             <a:ext cx="477988" cy="338554"/>
           </a:xfrm>
           <a:prstGeom prst="rect">
@@ -4618,7 +4616,7 @@
         </p:nvSpPr>
         <p:spPr>
           <a:xfrm>
-            <a:off x="7557603" y="4508078"/>
+            <a:off x="7557603" y="4615130"/>
             <a:ext cx="477988" cy="338554"/>
           </a:xfrm>
           <a:prstGeom prst="rect">
@@ -4677,7 +4675,7 @@
         </p:nvSpPr>
         <p:spPr>
           <a:xfrm>
-            <a:off x="0" y="6810208"/>
+            <a:off x="0" y="6917260"/>
             <a:ext cx="554960" cy="707886"/>
           </a:xfrm>
           <a:prstGeom prst="rect">
@@ -4715,7 +4713,7 @@
         </p:nvSpPr>
         <p:spPr>
           <a:xfrm>
-            <a:off x="10496215" y="12455138"/>
+            <a:off x="10123422" y="12164696"/>
             <a:ext cx="2847253" cy="738664"/>
           </a:xfrm>
           <a:prstGeom prst="rect">
@@ -4770,7 +4768,7 @@
         </p:nvCxnSpPr>
         <p:spPr>
           <a:xfrm>
-            <a:off x="10494451" y="7931426"/>
+            <a:off x="10901727" y="7781264"/>
             <a:ext cx="0" cy="4015409"/>
           </a:xfrm>
           <a:prstGeom prst="line">
@@ -4798,82 +4796,6 @@
           </a:fontRef>
         </p:style>
       </p:cxnSp>
-      <p:sp>
-        <p:nvSpPr>
-          <p:cNvPr id="53" name="Rectangle 52">
-            <a:extLst>
-              <a:ext uri="{FF2B5EF4-FFF2-40B4-BE49-F238E27FC236}">
-                <a16:creationId xmlns:a16="http://schemas.microsoft.com/office/drawing/2014/main" id="{3D1D5825-802B-0B42-9B90-9FB0328E2AB2}"/>
-              </a:ext>
-            </a:extLst>
-          </p:cNvPr>
-          <p:cNvSpPr/>
-          <p:nvPr/>
-        </p:nvSpPr>
-        <p:spPr>
-          <a:xfrm>
-            <a:off x="9507584" y="4005137"/>
-            <a:ext cx="479618" cy="369332"/>
-          </a:xfrm>
-          <a:prstGeom prst="rect">
-            <a:avLst/>
-          </a:prstGeom>
-        </p:spPr>
-        <p:txBody>
-          <a:bodyPr wrap="none">
-            <a:spAutoFit/>
-          </a:bodyPr>
-          <a:lstStyle/>
-          <a:p>
-            <a:pPr algn="ctr"/>
-            <a:r>
-              <a:rPr lang="en-US" dirty="0">
-                <a:latin typeface="Arial" panose="020B0604020202020204" pitchFamily="34" charset="0"/>
-                <a:cs typeface="Arial" panose="020B0604020202020204" pitchFamily="34" charset="0"/>
-              </a:rPr>
-              <a:t>Fill</a:t>
-            </a:r>
-          </a:p>
-        </p:txBody>
-      </p:sp>
-      <p:sp>
-        <p:nvSpPr>
-          <p:cNvPr id="54" name="Rectangle 53">
-            <a:extLst>
-              <a:ext uri="{FF2B5EF4-FFF2-40B4-BE49-F238E27FC236}">
-                <a16:creationId xmlns:a16="http://schemas.microsoft.com/office/drawing/2014/main" id="{CF4DFECD-2670-964A-8DF6-29ED572E6189}"/>
-              </a:ext>
-            </a:extLst>
-          </p:cNvPr>
-          <p:cNvSpPr/>
-          <p:nvPr/>
-        </p:nvSpPr>
-        <p:spPr>
-          <a:xfrm>
-            <a:off x="9060228" y="1507655"/>
-            <a:ext cx="915635" cy="369332"/>
-          </a:xfrm>
-          <a:prstGeom prst="rect">
-            <a:avLst/>
-          </a:prstGeom>
-        </p:spPr>
-        <p:txBody>
-          <a:bodyPr wrap="none">
-            <a:spAutoFit/>
-          </a:bodyPr>
-          <a:lstStyle/>
-          <a:p>
-            <a:pPr algn="ctr"/>
-            <a:r>
-              <a:rPr lang="en-US" dirty="0">
-                <a:latin typeface="Arial" panose="020B0604020202020204" pitchFamily="34" charset="0"/>
-                <a:cs typeface="Arial" panose="020B0604020202020204" pitchFamily="34" charset="0"/>
-              </a:rPr>
-              <a:t>Outline</a:t>
-            </a:r>
-          </a:p>
-        </p:txBody>
-      </p:sp>
     </p:spTree>
     <p:extLst>
       <p:ext uri="{BB962C8B-B14F-4D97-AF65-F5344CB8AC3E}">

</xml_diff>